<commit_message>
Add figure of shifts on structure
</commit_message>
<xml_diff>
--- a/paper/figures/shifts_on_structure/shifts_on_structure.pptx
+++ b/paper/figures/shifts_on_structure/shifts_on_structure.pptx
@@ -6,6 +6,8 @@
   </p:sldMasterIdLst>
   <p:sldIdLst>
     <p:sldId id="261" r:id="rId2"/>
+    <p:sldId id="263" r:id="rId3"/>
+    <p:sldId id="262" r:id="rId4"/>
   </p:sldIdLst>
   <p:sldSz cx="3749675" cy="1736725"/>
   <p:notesSz cx="6858000" cy="9144000"/>
@@ -288,7 +290,7 @@
           <a:p>
             <a:fld id="{B1E60CEC-8CC6-8B48-9CD4-E19D93CC4CEE}" type="datetimeFigureOut">
               <a:rPr lang="en-US" smtClean="0"/>
-              <a:t>11/25/17</a:t>
+              <a:t>11/27/17</a:t>
             </a:fld>
             <a:endParaRPr lang="en-US"/>
           </a:p>
@@ -458,7 +460,7 @@
           <a:p>
             <a:fld id="{B1E60CEC-8CC6-8B48-9CD4-E19D93CC4CEE}" type="datetimeFigureOut">
               <a:rPr lang="en-US" smtClean="0"/>
-              <a:t>11/25/17</a:t>
+              <a:t>11/27/17</a:t>
             </a:fld>
             <a:endParaRPr lang="en-US"/>
           </a:p>
@@ -638,7 +640,7 @@
           <a:p>
             <a:fld id="{B1E60CEC-8CC6-8B48-9CD4-E19D93CC4CEE}" type="datetimeFigureOut">
               <a:rPr lang="en-US" smtClean="0"/>
-              <a:t>11/25/17</a:t>
+              <a:t>11/27/17</a:t>
             </a:fld>
             <a:endParaRPr lang="en-US"/>
           </a:p>
@@ -808,7 +810,7 @@
           <a:p>
             <a:fld id="{B1E60CEC-8CC6-8B48-9CD4-E19D93CC4CEE}" type="datetimeFigureOut">
               <a:rPr lang="en-US" smtClean="0"/>
-              <a:t>11/25/17</a:t>
+              <a:t>11/27/17</a:t>
             </a:fld>
             <a:endParaRPr lang="en-US"/>
           </a:p>
@@ -1054,7 +1056,7 @@
           <a:p>
             <a:fld id="{B1E60CEC-8CC6-8B48-9CD4-E19D93CC4CEE}" type="datetimeFigureOut">
               <a:rPr lang="en-US" smtClean="0"/>
-              <a:t>11/25/17</a:t>
+              <a:t>11/27/17</a:t>
             </a:fld>
             <a:endParaRPr lang="en-US"/>
           </a:p>
@@ -1342,7 +1344,7 @@
           <a:p>
             <a:fld id="{B1E60CEC-8CC6-8B48-9CD4-E19D93CC4CEE}" type="datetimeFigureOut">
               <a:rPr lang="en-US" smtClean="0"/>
-              <a:t>11/25/17</a:t>
+              <a:t>11/27/17</a:t>
             </a:fld>
             <a:endParaRPr lang="en-US"/>
           </a:p>
@@ -1769,7 +1771,7 @@
           <a:p>
             <a:fld id="{B1E60CEC-8CC6-8B48-9CD4-E19D93CC4CEE}" type="datetimeFigureOut">
               <a:rPr lang="en-US" smtClean="0"/>
-              <a:t>11/25/17</a:t>
+              <a:t>11/27/17</a:t>
             </a:fld>
             <a:endParaRPr lang="en-US"/>
           </a:p>
@@ -1887,7 +1889,7 @@
           <a:p>
             <a:fld id="{B1E60CEC-8CC6-8B48-9CD4-E19D93CC4CEE}" type="datetimeFigureOut">
               <a:rPr lang="en-US" smtClean="0"/>
-              <a:t>11/25/17</a:t>
+              <a:t>11/27/17</a:t>
             </a:fld>
             <a:endParaRPr lang="en-US"/>
           </a:p>
@@ -1982,7 +1984,7 @@
           <a:p>
             <a:fld id="{B1E60CEC-8CC6-8B48-9CD4-E19D93CC4CEE}" type="datetimeFigureOut">
               <a:rPr lang="en-US" smtClean="0"/>
-              <a:t>11/25/17</a:t>
+              <a:t>11/27/17</a:t>
             </a:fld>
             <a:endParaRPr lang="en-US"/>
           </a:p>
@@ -2259,7 +2261,7 @@
           <a:p>
             <a:fld id="{B1E60CEC-8CC6-8B48-9CD4-E19D93CC4CEE}" type="datetimeFigureOut">
               <a:rPr lang="en-US" smtClean="0"/>
-              <a:t>11/25/17</a:t>
+              <a:t>11/27/17</a:t>
             </a:fld>
             <a:endParaRPr lang="en-US"/>
           </a:p>
@@ -2512,7 +2514,7 @@
           <a:p>
             <a:fld id="{B1E60CEC-8CC6-8B48-9CD4-E19D93CC4CEE}" type="datetimeFigureOut">
               <a:rPr lang="en-US" smtClean="0"/>
-              <a:t>11/25/17</a:t>
+              <a:t>11/27/17</a:t>
             </a:fld>
             <a:endParaRPr lang="en-US"/>
           </a:p>
@@ -2725,7 +2727,7 @@
           <a:p>
             <a:fld id="{B1E60CEC-8CC6-8B48-9CD4-E19D93CC4CEE}" type="datetimeFigureOut">
               <a:rPr lang="en-US" smtClean="0"/>
-              <a:t>11/25/17</a:t>
+              <a:t>11/27/17</a:t>
             </a:fld>
             <a:endParaRPr lang="en-US"/>
           </a:p>
@@ -3100,6 +3102,380 @@
           <a:chExt cx="0" cy="0"/>
         </a:xfrm>
       </p:grpSpPr>
+      <p:cxnSp>
+        <p:nvCxnSpPr>
+          <p:cNvPr id="16" name="Straight Connector 15"/>
+          <p:cNvCxnSpPr/>
+          <p:nvPr/>
+        </p:nvCxnSpPr>
+        <p:spPr>
+          <a:xfrm>
+            <a:off x="1861455" y="976328"/>
+            <a:ext cx="0" cy="353256"/>
+          </a:xfrm>
+          <a:prstGeom prst="line">
+            <a:avLst/>
+          </a:prstGeom>
+        </p:spPr>
+        <p:style>
+          <a:lnRef idx="1">
+            <a:schemeClr val="dk1"/>
+          </a:lnRef>
+          <a:fillRef idx="0">
+            <a:schemeClr val="dk1"/>
+          </a:fillRef>
+          <a:effectRef idx="0">
+            <a:schemeClr val="dk1"/>
+          </a:effectRef>
+          <a:fontRef idx="minor">
+            <a:schemeClr val="tx1"/>
+          </a:fontRef>
+        </p:style>
+      </p:cxnSp>
+      <p:sp>
+        <p:nvSpPr>
+          <p:cNvPr id="17" name="Curved Up Arrow 16"/>
+          <p:cNvSpPr/>
+          <p:nvPr/>
+        </p:nvSpPr>
+        <p:spPr>
+          <a:xfrm>
+            <a:off x="1659610" y="1072158"/>
+            <a:ext cx="403690" cy="92520"/>
+          </a:xfrm>
+          <a:prstGeom prst="curvedUpArrow">
+            <a:avLst/>
+          </a:prstGeom>
+        </p:spPr>
+        <p:style>
+          <a:lnRef idx="2">
+            <a:schemeClr val="dk1"/>
+          </a:lnRef>
+          <a:fillRef idx="1">
+            <a:schemeClr val="lt1"/>
+          </a:fillRef>
+          <a:effectRef idx="0">
+            <a:schemeClr val="dk1"/>
+          </a:effectRef>
+          <a:fontRef idx="minor">
+            <a:schemeClr val="dk1"/>
+          </a:fontRef>
+        </p:style>
+        <p:txBody>
+          <a:bodyPr rtlCol="0" anchor="ctr"/>
+          <a:lstStyle/>
+          <a:p>
+            <a:pPr algn="ctr"/>
+            <a:endParaRPr lang="en-US">
+              <a:solidFill>
+                <a:schemeClr val="tx1"/>
+              </a:solidFill>
+            </a:endParaRPr>
+          </a:p>
+        </p:txBody>
+      </p:sp>
+      <p:sp>
+        <p:nvSpPr>
+          <p:cNvPr id="18" name="TextBox 17"/>
+          <p:cNvSpPr txBox="1"/>
+          <p:nvPr/>
+        </p:nvSpPr>
+        <p:spPr>
+          <a:xfrm>
+            <a:off x="1621673" y="1301673"/>
+            <a:ext cx="471547" cy="261610"/>
+          </a:xfrm>
+          <a:prstGeom prst="rect">
+            <a:avLst/>
+          </a:prstGeom>
+          <a:noFill/>
+        </p:spPr>
+        <p:txBody>
+          <a:bodyPr wrap="none" rtlCol="0">
+            <a:spAutoFit/>
+          </a:bodyPr>
+          <a:lstStyle/>
+          <a:p>
+            <a:pPr algn="ctr"/>
+            <a:r>
+              <a:rPr lang="en-US" sz="1100" dirty="0" smtClean="0">
+                <a:latin typeface="Arial"/>
+                <a:cs typeface="Arial"/>
+              </a:rPr>
+              <a:t>120º</a:t>
+            </a:r>
+            <a:endParaRPr lang="en-US" sz="1100" dirty="0">
+              <a:latin typeface="Arial"/>
+              <a:cs typeface="Arial"/>
+            </a:endParaRPr>
+          </a:p>
+        </p:txBody>
+      </p:sp>
+      <p:pic>
+        <p:nvPicPr>
+          <p:cNvPr id="2" name="Picture 1"/>
+          <p:cNvPicPr>
+            <a:picLocks noChangeAspect="1"/>
+          </p:cNvPicPr>
+          <p:nvPr/>
+        </p:nvPicPr>
+        <p:blipFill>
+          <a:blip r:embed="rId2"/>
+          <a:stretch>
+            <a:fillRect/>
+          </a:stretch>
+        </p:blipFill>
+        <p:spPr>
+          <a:xfrm>
+            <a:off x="-709738" y="-137079"/>
+            <a:ext cx="3254767" cy="1965879"/>
+          </a:xfrm>
+          <a:prstGeom prst="rect">
+            <a:avLst/>
+          </a:prstGeom>
+        </p:spPr>
+      </p:pic>
+      <p:pic>
+        <p:nvPicPr>
+          <p:cNvPr id="3" name="Picture 2"/>
+          <p:cNvPicPr>
+            <a:picLocks noChangeAspect="1"/>
+          </p:cNvPicPr>
+          <p:nvPr/>
+        </p:nvPicPr>
+        <p:blipFill>
+          <a:blip r:embed="rId3"/>
+          <a:stretch>
+            <a:fillRect/>
+          </a:stretch>
+        </p:blipFill>
+        <p:spPr>
+          <a:xfrm>
+            <a:off x="1158142" y="-137079"/>
+            <a:ext cx="3254767" cy="1965879"/>
+          </a:xfrm>
+          <a:prstGeom prst="rect">
+            <a:avLst/>
+          </a:prstGeom>
+        </p:spPr>
+      </p:pic>
+    </p:spTree>
+    <p:extLst>
+      <p:ext uri="{BB962C8B-B14F-4D97-AF65-F5344CB8AC3E}">
+        <p14:creationId xmlns:p14="http://schemas.microsoft.com/office/powerpoint/2010/main" val="2997357567"/>
+      </p:ext>
+    </p:extLst>
+  </p:cSld>
+  <p:clrMapOvr>
+    <a:masterClrMapping/>
+  </p:clrMapOvr>
+</p:sld>
+</file>
+
+<file path=ppt/slides/slide2.xml><?xml version="1.0" encoding="utf-8"?>
+<p:sld xmlns:a="http://schemas.openxmlformats.org/drawingml/2006/main" xmlns:r="http://schemas.openxmlformats.org/officeDocument/2006/relationships" xmlns:p="http://schemas.openxmlformats.org/presentationml/2006/main">
+  <p:cSld>
+    <p:spTree>
+      <p:nvGrpSpPr>
+        <p:cNvPr id="1" name=""/>
+        <p:cNvGrpSpPr/>
+        <p:nvPr/>
+      </p:nvGrpSpPr>
+      <p:grpSpPr>
+        <a:xfrm>
+          <a:off x="0" y="0"/>
+          <a:ext cx="0" cy="0"/>
+          <a:chOff x="0" y="0"/>
+          <a:chExt cx="0" cy="0"/>
+        </a:xfrm>
+      </p:grpSpPr>
+      <p:pic>
+        <p:nvPicPr>
+          <p:cNvPr id="13" name="Picture 12"/>
+          <p:cNvPicPr>
+            <a:picLocks noChangeAspect="1"/>
+          </p:cNvPicPr>
+          <p:nvPr/>
+        </p:nvPicPr>
+        <p:blipFill>
+          <a:blip r:embed="rId2"/>
+          <a:stretch>
+            <a:fillRect/>
+          </a:stretch>
+        </p:blipFill>
+        <p:spPr>
+          <a:xfrm>
+            <a:off x="-404938" y="-137079"/>
+            <a:ext cx="2645866" cy="1965879"/>
+          </a:xfrm>
+          <a:prstGeom prst="rect">
+            <a:avLst/>
+          </a:prstGeom>
+        </p:spPr>
+      </p:pic>
+      <p:pic>
+        <p:nvPicPr>
+          <p:cNvPr id="14" name="Picture 13"/>
+          <p:cNvPicPr>
+            <a:picLocks noChangeAspect="1"/>
+          </p:cNvPicPr>
+          <p:nvPr/>
+        </p:nvPicPr>
+        <p:blipFill>
+          <a:blip r:embed="rId3"/>
+          <a:stretch>
+            <a:fillRect/>
+          </a:stretch>
+        </p:blipFill>
+        <p:spPr>
+          <a:xfrm>
+            <a:off x="1462868" y="-137079"/>
+            <a:ext cx="2645866" cy="1965879"/>
+          </a:xfrm>
+          <a:prstGeom prst="rect">
+            <a:avLst/>
+          </a:prstGeom>
+        </p:spPr>
+      </p:pic>
+      <p:cxnSp>
+        <p:nvCxnSpPr>
+          <p:cNvPr id="16" name="Straight Connector 15"/>
+          <p:cNvCxnSpPr/>
+          <p:nvPr/>
+        </p:nvCxnSpPr>
+        <p:spPr>
+          <a:xfrm>
+            <a:off x="1861455" y="976328"/>
+            <a:ext cx="0" cy="353256"/>
+          </a:xfrm>
+          <a:prstGeom prst="line">
+            <a:avLst/>
+          </a:prstGeom>
+        </p:spPr>
+        <p:style>
+          <a:lnRef idx="1">
+            <a:schemeClr val="dk1"/>
+          </a:lnRef>
+          <a:fillRef idx="0">
+            <a:schemeClr val="dk1"/>
+          </a:fillRef>
+          <a:effectRef idx="0">
+            <a:schemeClr val="dk1"/>
+          </a:effectRef>
+          <a:fontRef idx="minor">
+            <a:schemeClr val="tx1"/>
+          </a:fontRef>
+        </p:style>
+      </p:cxnSp>
+      <p:sp>
+        <p:nvSpPr>
+          <p:cNvPr id="17" name="Curved Up Arrow 16"/>
+          <p:cNvSpPr/>
+          <p:nvPr/>
+        </p:nvSpPr>
+        <p:spPr>
+          <a:xfrm>
+            <a:off x="1659610" y="1072158"/>
+            <a:ext cx="403690" cy="92520"/>
+          </a:xfrm>
+          <a:prstGeom prst="curvedUpArrow">
+            <a:avLst/>
+          </a:prstGeom>
+        </p:spPr>
+        <p:style>
+          <a:lnRef idx="2">
+            <a:schemeClr val="dk1"/>
+          </a:lnRef>
+          <a:fillRef idx="1">
+            <a:schemeClr val="lt1"/>
+          </a:fillRef>
+          <a:effectRef idx="0">
+            <a:schemeClr val="dk1"/>
+          </a:effectRef>
+          <a:fontRef idx="minor">
+            <a:schemeClr val="dk1"/>
+          </a:fontRef>
+        </p:style>
+        <p:txBody>
+          <a:bodyPr rtlCol="0" anchor="ctr"/>
+          <a:lstStyle/>
+          <a:p>
+            <a:pPr algn="ctr"/>
+            <a:endParaRPr lang="en-US">
+              <a:solidFill>
+                <a:schemeClr val="tx1"/>
+              </a:solidFill>
+            </a:endParaRPr>
+          </a:p>
+        </p:txBody>
+      </p:sp>
+      <p:sp>
+        <p:nvSpPr>
+          <p:cNvPr id="18" name="TextBox 17"/>
+          <p:cNvSpPr txBox="1"/>
+          <p:nvPr/>
+        </p:nvSpPr>
+        <p:spPr>
+          <a:xfrm>
+            <a:off x="1621673" y="1301673"/>
+            <a:ext cx="471547" cy="261610"/>
+          </a:xfrm>
+          <a:prstGeom prst="rect">
+            <a:avLst/>
+          </a:prstGeom>
+          <a:noFill/>
+        </p:spPr>
+        <p:txBody>
+          <a:bodyPr wrap="none" rtlCol="0">
+            <a:spAutoFit/>
+          </a:bodyPr>
+          <a:lstStyle/>
+          <a:p>
+            <a:pPr algn="ctr"/>
+            <a:r>
+              <a:rPr lang="en-US" sz="1100" dirty="0" smtClean="0">
+                <a:latin typeface="Arial"/>
+                <a:cs typeface="Arial"/>
+              </a:rPr>
+              <a:t>120º</a:t>
+            </a:r>
+            <a:endParaRPr lang="en-US" sz="1100" dirty="0">
+              <a:latin typeface="Arial"/>
+              <a:cs typeface="Arial"/>
+            </a:endParaRPr>
+          </a:p>
+        </p:txBody>
+      </p:sp>
+    </p:spTree>
+    <p:extLst>
+      <p:ext uri="{BB962C8B-B14F-4D97-AF65-F5344CB8AC3E}">
+        <p14:creationId xmlns:p14="http://schemas.microsoft.com/office/powerpoint/2010/main" val="4145956224"/>
+      </p:ext>
+    </p:extLst>
+  </p:cSld>
+  <p:clrMapOvr>
+    <a:masterClrMapping/>
+  </p:clrMapOvr>
+</p:sld>
+</file>
+
+<file path=ppt/slides/slide3.xml><?xml version="1.0" encoding="utf-8"?>
+<p:sld xmlns:a="http://schemas.openxmlformats.org/drawingml/2006/main" xmlns:r="http://schemas.openxmlformats.org/officeDocument/2006/relationships" xmlns:p="http://schemas.openxmlformats.org/presentationml/2006/main">
+  <p:cSld>
+    <p:spTree>
+      <p:nvGrpSpPr>
+        <p:cNvPr id="1" name=""/>
+        <p:cNvGrpSpPr/>
+        <p:nvPr/>
+      </p:nvGrpSpPr>
+      <p:grpSpPr>
+        <a:xfrm>
+          <a:off x="0" y="0"/>
+          <a:ext cx="0" cy="0"/>
+          <a:chOff x="0" y="0"/>
+          <a:chExt cx="0" cy="0"/>
+        </a:xfrm>
+      </p:grpSpPr>
       <p:grpSp>
         <p:nvGrpSpPr>
           <p:cNvPr id="10" name="Group 9"/>
@@ -3300,7 +3676,9 @@
             <a:prstGeom prst="rect">
               <a:avLst/>
             </a:prstGeom>
-            <a:noFill/>
+            <a:solidFill>
+              <a:schemeClr val="bg1"/>
+            </a:solidFill>
           </p:spPr>
           <p:txBody>
             <a:bodyPr wrap="square" rtlCol="0">
@@ -3425,7 +3803,7 @@
     </p:spTree>
     <p:extLst>
       <p:ext uri="{BB962C8B-B14F-4D97-AF65-F5344CB8AC3E}">
-        <p14:creationId xmlns:p14="http://schemas.microsoft.com/office/powerpoint/2010/main" val="2997357567"/>
+        <p14:creationId xmlns:p14="http://schemas.microsoft.com/office/powerpoint/2010/main" val="3238785612"/>
       </p:ext>
     </p:extLst>
   </p:cSld>

</xml_diff>

<commit_message>
Tweak figure on shifts on structure
</commit_message>
<xml_diff>
--- a/paper/figures/shifts_on_structure/shifts_on_structure.pptx
+++ b/paper/figures/shifts_on_structure/shifts_on_structure.pptx
@@ -6,8 +6,6 @@
   </p:sldMasterIdLst>
   <p:sldIdLst>
     <p:sldId id="261" r:id="rId2"/>
-    <p:sldId id="263" r:id="rId3"/>
-    <p:sldId id="262" r:id="rId4"/>
   </p:sldIdLst>
   <p:sldSz cx="3749675" cy="1736725"/>
   <p:notesSz cx="6858000" cy="9144000"/>
@@ -3263,547 +3261,6 @@
     <p:extLst>
       <p:ext uri="{BB962C8B-B14F-4D97-AF65-F5344CB8AC3E}">
         <p14:creationId xmlns:p14="http://schemas.microsoft.com/office/powerpoint/2010/main" val="2997357567"/>
-      </p:ext>
-    </p:extLst>
-  </p:cSld>
-  <p:clrMapOvr>
-    <a:masterClrMapping/>
-  </p:clrMapOvr>
-</p:sld>
-</file>
-
-<file path=ppt/slides/slide2.xml><?xml version="1.0" encoding="utf-8"?>
-<p:sld xmlns:a="http://schemas.openxmlformats.org/drawingml/2006/main" xmlns:r="http://schemas.openxmlformats.org/officeDocument/2006/relationships" xmlns:p="http://schemas.openxmlformats.org/presentationml/2006/main">
-  <p:cSld>
-    <p:spTree>
-      <p:nvGrpSpPr>
-        <p:cNvPr id="1" name=""/>
-        <p:cNvGrpSpPr/>
-        <p:nvPr/>
-      </p:nvGrpSpPr>
-      <p:grpSpPr>
-        <a:xfrm>
-          <a:off x="0" y="0"/>
-          <a:ext cx="0" cy="0"/>
-          <a:chOff x="0" y="0"/>
-          <a:chExt cx="0" cy="0"/>
-        </a:xfrm>
-      </p:grpSpPr>
-      <p:pic>
-        <p:nvPicPr>
-          <p:cNvPr id="13" name="Picture 12"/>
-          <p:cNvPicPr>
-            <a:picLocks noChangeAspect="1"/>
-          </p:cNvPicPr>
-          <p:nvPr/>
-        </p:nvPicPr>
-        <p:blipFill>
-          <a:blip r:embed="rId2"/>
-          <a:stretch>
-            <a:fillRect/>
-          </a:stretch>
-        </p:blipFill>
-        <p:spPr>
-          <a:xfrm>
-            <a:off x="-404938" y="-137079"/>
-            <a:ext cx="2645866" cy="1965879"/>
-          </a:xfrm>
-          <a:prstGeom prst="rect">
-            <a:avLst/>
-          </a:prstGeom>
-        </p:spPr>
-      </p:pic>
-      <p:pic>
-        <p:nvPicPr>
-          <p:cNvPr id="14" name="Picture 13"/>
-          <p:cNvPicPr>
-            <a:picLocks noChangeAspect="1"/>
-          </p:cNvPicPr>
-          <p:nvPr/>
-        </p:nvPicPr>
-        <p:blipFill>
-          <a:blip r:embed="rId3"/>
-          <a:stretch>
-            <a:fillRect/>
-          </a:stretch>
-        </p:blipFill>
-        <p:spPr>
-          <a:xfrm>
-            <a:off x="1462868" y="-137079"/>
-            <a:ext cx="2645866" cy="1965879"/>
-          </a:xfrm>
-          <a:prstGeom prst="rect">
-            <a:avLst/>
-          </a:prstGeom>
-        </p:spPr>
-      </p:pic>
-      <p:cxnSp>
-        <p:nvCxnSpPr>
-          <p:cNvPr id="16" name="Straight Connector 15"/>
-          <p:cNvCxnSpPr/>
-          <p:nvPr/>
-        </p:nvCxnSpPr>
-        <p:spPr>
-          <a:xfrm>
-            <a:off x="1861455" y="976328"/>
-            <a:ext cx="0" cy="353256"/>
-          </a:xfrm>
-          <a:prstGeom prst="line">
-            <a:avLst/>
-          </a:prstGeom>
-        </p:spPr>
-        <p:style>
-          <a:lnRef idx="1">
-            <a:schemeClr val="dk1"/>
-          </a:lnRef>
-          <a:fillRef idx="0">
-            <a:schemeClr val="dk1"/>
-          </a:fillRef>
-          <a:effectRef idx="0">
-            <a:schemeClr val="dk1"/>
-          </a:effectRef>
-          <a:fontRef idx="minor">
-            <a:schemeClr val="tx1"/>
-          </a:fontRef>
-        </p:style>
-      </p:cxnSp>
-      <p:sp>
-        <p:nvSpPr>
-          <p:cNvPr id="17" name="Curved Up Arrow 16"/>
-          <p:cNvSpPr/>
-          <p:nvPr/>
-        </p:nvSpPr>
-        <p:spPr>
-          <a:xfrm>
-            <a:off x="1659610" y="1072158"/>
-            <a:ext cx="403690" cy="92520"/>
-          </a:xfrm>
-          <a:prstGeom prst="curvedUpArrow">
-            <a:avLst/>
-          </a:prstGeom>
-        </p:spPr>
-        <p:style>
-          <a:lnRef idx="2">
-            <a:schemeClr val="dk1"/>
-          </a:lnRef>
-          <a:fillRef idx="1">
-            <a:schemeClr val="lt1"/>
-          </a:fillRef>
-          <a:effectRef idx="0">
-            <a:schemeClr val="dk1"/>
-          </a:effectRef>
-          <a:fontRef idx="minor">
-            <a:schemeClr val="dk1"/>
-          </a:fontRef>
-        </p:style>
-        <p:txBody>
-          <a:bodyPr rtlCol="0" anchor="ctr"/>
-          <a:lstStyle/>
-          <a:p>
-            <a:pPr algn="ctr"/>
-            <a:endParaRPr lang="en-US">
-              <a:solidFill>
-                <a:schemeClr val="tx1"/>
-              </a:solidFill>
-            </a:endParaRPr>
-          </a:p>
-        </p:txBody>
-      </p:sp>
-      <p:sp>
-        <p:nvSpPr>
-          <p:cNvPr id="18" name="TextBox 17"/>
-          <p:cNvSpPr txBox="1"/>
-          <p:nvPr/>
-        </p:nvSpPr>
-        <p:spPr>
-          <a:xfrm>
-            <a:off x="1621673" y="1301673"/>
-            <a:ext cx="471547" cy="261610"/>
-          </a:xfrm>
-          <a:prstGeom prst="rect">
-            <a:avLst/>
-          </a:prstGeom>
-          <a:noFill/>
-        </p:spPr>
-        <p:txBody>
-          <a:bodyPr wrap="none" rtlCol="0">
-            <a:spAutoFit/>
-          </a:bodyPr>
-          <a:lstStyle/>
-          <a:p>
-            <a:pPr algn="ctr"/>
-            <a:r>
-              <a:rPr lang="en-US" sz="1100" dirty="0" smtClean="0">
-                <a:latin typeface="Arial"/>
-                <a:cs typeface="Arial"/>
-              </a:rPr>
-              <a:t>120º</a:t>
-            </a:r>
-            <a:endParaRPr lang="en-US" sz="1100" dirty="0">
-              <a:latin typeface="Arial"/>
-              <a:cs typeface="Arial"/>
-            </a:endParaRPr>
-          </a:p>
-        </p:txBody>
-      </p:sp>
-    </p:spTree>
-    <p:extLst>
-      <p:ext uri="{BB962C8B-B14F-4D97-AF65-F5344CB8AC3E}">
-        <p14:creationId xmlns:p14="http://schemas.microsoft.com/office/powerpoint/2010/main" val="4145956224"/>
-      </p:ext>
-    </p:extLst>
-  </p:cSld>
-  <p:clrMapOvr>
-    <a:masterClrMapping/>
-  </p:clrMapOvr>
-</p:sld>
-</file>
-
-<file path=ppt/slides/slide3.xml><?xml version="1.0" encoding="utf-8"?>
-<p:sld xmlns:a="http://schemas.openxmlformats.org/drawingml/2006/main" xmlns:r="http://schemas.openxmlformats.org/officeDocument/2006/relationships" xmlns:p="http://schemas.openxmlformats.org/presentationml/2006/main">
-  <p:cSld>
-    <p:spTree>
-      <p:nvGrpSpPr>
-        <p:cNvPr id="1" name=""/>
-        <p:cNvGrpSpPr/>
-        <p:nvPr/>
-      </p:nvGrpSpPr>
-      <p:grpSpPr>
-        <a:xfrm>
-          <a:off x="0" y="0"/>
-          <a:ext cx="0" cy="0"/>
-          <a:chOff x="0" y="0"/>
-          <a:chExt cx="0" cy="0"/>
-        </a:xfrm>
-      </p:grpSpPr>
-      <p:grpSp>
-        <p:nvGrpSpPr>
-          <p:cNvPr id="10" name="Group 9"/>
-          <p:cNvGrpSpPr/>
-          <p:nvPr/>
-        </p:nvGrpSpPr>
-        <p:grpSpPr>
-          <a:xfrm>
-            <a:off x="-404938" y="-137079"/>
-            <a:ext cx="4513672" cy="1965879"/>
-            <a:chOff x="-385888" y="-98067"/>
-            <a:chExt cx="4513672" cy="1965879"/>
-          </a:xfrm>
-        </p:grpSpPr>
-        <p:grpSp>
-          <p:nvGrpSpPr>
-            <p:cNvPr id="11" name="Group 10"/>
-            <p:cNvGrpSpPr/>
-            <p:nvPr/>
-          </p:nvGrpSpPr>
-          <p:grpSpPr>
-            <a:xfrm>
-              <a:off x="-385888" y="-98067"/>
-              <a:ext cx="4513672" cy="1965879"/>
-              <a:chOff x="-385888" y="-98067"/>
-              <a:chExt cx="4513672" cy="1965879"/>
-            </a:xfrm>
-          </p:grpSpPr>
-          <p:pic>
-            <p:nvPicPr>
-              <p:cNvPr id="13" name="Picture 12"/>
-              <p:cNvPicPr>
-                <a:picLocks noChangeAspect="1"/>
-              </p:cNvPicPr>
-              <p:nvPr/>
-            </p:nvPicPr>
-            <p:blipFill>
-              <a:blip r:embed="rId2"/>
-              <a:stretch>
-                <a:fillRect/>
-              </a:stretch>
-            </p:blipFill>
-            <p:spPr>
-              <a:xfrm>
-                <a:off x="-385888" y="-98067"/>
-                <a:ext cx="2645866" cy="1965879"/>
-              </a:xfrm>
-              <a:prstGeom prst="rect">
-                <a:avLst/>
-              </a:prstGeom>
-            </p:spPr>
-          </p:pic>
-          <p:pic>
-            <p:nvPicPr>
-              <p:cNvPr id="14" name="Picture 13"/>
-              <p:cNvPicPr>
-                <a:picLocks noChangeAspect="1"/>
-              </p:cNvPicPr>
-              <p:nvPr/>
-            </p:nvPicPr>
-            <p:blipFill>
-              <a:blip r:embed="rId3"/>
-              <a:stretch>
-                <a:fillRect/>
-              </a:stretch>
-            </p:blipFill>
-            <p:spPr>
-              <a:xfrm>
-                <a:off x="1481918" y="-98067"/>
-                <a:ext cx="2645866" cy="1965879"/>
-              </a:xfrm>
-              <a:prstGeom prst="rect">
-                <a:avLst/>
-              </a:prstGeom>
-            </p:spPr>
-          </p:pic>
-          <p:cxnSp>
-            <p:nvCxnSpPr>
-              <p:cNvPr id="16" name="Straight Connector 15"/>
-              <p:cNvCxnSpPr/>
-              <p:nvPr/>
-            </p:nvCxnSpPr>
-            <p:spPr>
-              <a:xfrm>
-                <a:off x="1880505" y="1015340"/>
-                <a:ext cx="0" cy="353256"/>
-              </a:xfrm>
-              <a:prstGeom prst="line">
-                <a:avLst/>
-              </a:prstGeom>
-            </p:spPr>
-            <p:style>
-              <a:lnRef idx="1">
-                <a:schemeClr val="dk1"/>
-              </a:lnRef>
-              <a:fillRef idx="0">
-                <a:schemeClr val="dk1"/>
-              </a:fillRef>
-              <a:effectRef idx="0">
-                <a:schemeClr val="dk1"/>
-              </a:effectRef>
-              <a:fontRef idx="minor">
-                <a:schemeClr val="tx1"/>
-              </a:fontRef>
-            </p:style>
-          </p:cxnSp>
-          <p:sp>
-            <p:nvSpPr>
-              <p:cNvPr id="17" name="Curved Up Arrow 16"/>
-              <p:cNvSpPr/>
-              <p:nvPr/>
-            </p:nvSpPr>
-            <p:spPr>
-              <a:xfrm>
-                <a:off x="1678660" y="1111170"/>
-                <a:ext cx="403690" cy="92520"/>
-              </a:xfrm>
-              <a:prstGeom prst="curvedUpArrow">
-                <a:avLst/>
-              </a:prstGeom>
-            </p:spPr>
-            <p:style>
-              <a:lnRef idx="2">
-                <a:schemeClr val="dk1"/>
-              </a:lnRef>
-              <a:fillRef idx="1">
-                <a:schemeClr val="lt1"/>
-              </a:fillRef>
-              <a:effectRef idx="0">
-                <a:schemeClr val="dk1"/>
-              </a:effectRef>
-              <a:fontRef idx="minor">
-                <a:schemeClr val="dk1"/>
-              </a:fontRef>
-            </p:style>
-            <p:txBody>
-              <a:bodyPr rtlCol="0" anchor="ctr"/>
-              <a:lstStyle/>
-              <a:p>
-                <a:pPr algn="ctr"/>
-                <a:endParaRPr lang="en-US">
-                  <a:solidFill>
-                    <a:schemeClr val="tx1"/>
-                  </a:solidFill>
-                </a:endParaRPr>
-              </a:p>
-            </p:txBody>
-          </p:sp>
-          <p:sp>
-            <p:nvSpPr>
-              <p:cNvPr id="18" name="TextBox 17"/>
-              <p:cNvSpPr txBox="1"/>
-              <p:nvPr/>
-            </p:nvSpPr>
-            <p:spPr>
-              <a:xfrm>
-                <a:off x="1640723" y="1340685"/>
-                <a:ext cx="471547" cy="261610"/>
-              </a:xfrm>
-              <a:prstGeom prst="rect">
-                <a:avLst/>
-              </a:prstGeom>
-              <a:noFill/>
-            </p:spPr>
-            <p:txBody>
-              <a:bodyPr wrap="none" rtlCol="0">
-                <a:spAutoFit/>
-              </a:bodyPr>
-              <a:lstStyle/>
-              <a:p>
-                <a:pPr algn="ctr"/>
-                <a:r>
-                  <a:rPr lang="en-US" sz="1100" dirty="0" smtClean="0">
-                    <a:latin typeface="Arial"/>
-                    <a:cs typeface="Arial"/>
-                  </a:rPr>
-                  <a:t>120º</a:t>
-                </a:r>
-                <a:endParaRPr lang="en-US" sz="1100" dirty="0">
-                  <a:latin typeface="Arial"/>
-                  <a:cs typeface="Arial"/>
-                </a:endParaRPr>
-              </a:p>
-            </p:txBody>
-          </p:sp>
-        </p:grpSp>
-        <p:sp>
-          <p:nvSpPr>
-            <p:cNvPr id="12" name="TextBox 11"/>
-            <p:cNvSpPr txBox="1"/>
-            <p:nvPr/>
-          </p:nvSpPr>
-          <p:spPr>
-            <a:xfrm>
-              <a:off x="51443" y="32154"/>
-              <a:ext cx="3739285" cy="1615827"/>
-            </a:xfrm>
-            <a:prstGeom prst="rect">
-              <a:avLst/>
-            </a:prstGeom>
-            <a:solidFill>
-              <a:schemeClr val="bg1"/>
-            </a:solidFill>
-          </p:spPr>
-          <p:txBody>
-            <a:bodyPr wrap="square" rtlCol="0">
-              <a:spAutoFit/>
-            </a:bodyPr>
-            <a:lstStyle/>
-            <a:p>
-              <a:r>
-                <a:rPr lang="en-US" sz="1100" b="1" dirty="0" smtClean="0">
-                  <a:solidFill>
-                    <a:srgbClr val="3366FF"/>
-                  </a:solidFill>
-                </a:rPr>
-                <a:t>Placeholder image. The real image should have one monomer colored gray to orange by the magnitude of the shift (</a:t>
-              </a:r>
-              <a:r>
-                <a:rPr lang="en-US" sz="1100" b="1" dirty="0" err="1" smtClean="0">
-                  <a:solidFill>
-                    <a:srgbClr val="3366FF"/>
-                  </a:solidFill>
-                </a:rPr>
-                <a:t>RMSDcorrected</a:t>
-              </a:r>
-              <a:r>
-                <a:rPr lang="en-US" sz="1100" b="1" dirty="0" smtClean="0">
-                  <a:solidFill>
-                    <a:srgbClr val="3366FF"/>
-                  </a:solidFill>
-                </a:rPr>
-                <a:t>) with sites of significant shifts in spheres. The data are in </a:t>
-              </a:r>
-              <a:r>
-                <a:rPr lang="en-US" sz="1100" b="1" dirty="0" smtClean="0">
-                  <a:solidFill>
-                    <a:srgbClr val="3366FF"/>
-                  </a:solidFill>
-                  <a:latin typeface="Courier"/>
-                  <a:cs typeface="Courier"/>
-                </a:rPr>
-                <a:t>./figures/BG505_to_BF520_prefs_dist.csv</a:t>
-              </a:r>
-              <a:r>
-                <a:rPr lang="en-US" sz="1100" b="1" dirty="0" smtClean="0">
-                  <a:solidFill>
-                    <a:srgbClr val="3366FF"/>
-                  </a:solidFill>
-                  <a:cs typeface="Courier"/>
-                </a:rPr>
-                <a:t>.</a:t>
-              </a:r>
-            </a:p>
-            <a:p>
-              <a:endParaRPr lang="en-US" sz="1100" b="1" dirty="0">
-                <a:solidFill>
-                  <a:srgbClr val="3366FF"/>
-                </a:solidFill>
-                <a:latin typeface="Courier"/>
-                <a:cs typeface="Courier"/>
-              </a:endParaRPr>
-            </a:p>
-            <a:p>
-              <a:r>
-                <a:rPr lang="en-US" sz="1100" b="1" dirty="0" smtClean="0">
-                  <a:solidFill>
-                    <a:srgbClr val="3366FF"/>
-                  </a:solidFill>
-                  <a:cs typeface="Courier"/>
-                </a:rPr>
-                <a:t>This image should go in the file: </a:t>
-              </a:r>
-              <a:r>
-                <a:rPr lang="en-US" sz="1100" b="1" dirty="0" smtClean="0">
-                  <a:solidFill>
-                    <a:srgbClr val="3366FF"/>
-                  </a:solidFill>
-                  <a:latin typeface="Courier"/>
-                  <a:cs typeface="Courier"/>
-                </a:rPr>
-                <a:t>./figures/</a:t>
-              </a:r>
-              <a:r>
-                <a:rPr lang="en-US" sz="1100" b="1" dirty="0" err="1" smtClean="0">
-                  <a:solidFill>
-                    <a:srgbClr val="3366FF"/>
-                  </a:solidFill>
-                  <a:latin typeface="Courier"/>
-                  <a:cs typeface="Courier"/>
-                </a:rPr>
-                <a:t>shifts_on_structure</a:t>
-              </a:r>
-              <a:r>
-                <a:rPr lang="en-US" sz="1100" b="1" dirty="0" smtClean="0">
-                  <a:solidFill>
-                    <a:srgbClr val="3366FF"/>
-                  </a:solidFill>
-                  <a:latin typeface="Courier"/>
-                  <a:cs typeface="Courier"/>
-                </a:rPr>
-                <a:t>/</a:t>
-              </a:r>
-              <a:r>
-                <a:rPr lang="en-US" sz="1100" b="1" dirty="0" err="1" smtClean="0">
-                  <a:solidFill>
-                    <a:srgbClr val="3366FF"/>
-                  </a:solidFill>
-                  <a:latin typeface="Courier"/>
-                  <a:cs typeface="Courier"/>
-                </a:rPr>
-                <a:t>shifts_on_structure.pdf</a:t>
-              </a:r>
-              <a:endParaRPr lang="en-US" sz="1100" b="1" dirty="0" smtClean="0">
-                <a:solidFill>
-                  <a:srgbClr val="3366FF"/>
-                </a:solidFill>
-                <a:latin typeface="Courier"/>
-                <a:cs typeface="Courier"/>
-              </a:endParaRPr>
-            </a:p>
-          </p:txBody>
-        </p:sp>
-      </p:grpSp>
-    </p:spTree>
-    <p:extLst>
-      <p:ext uri="{BB962C8B-B14F-4D97-AF65-F5344CB8AC3E}">
-        <p14:creationId xmlns:p14="http://schemas.microsoft.com/office/powerpoint/2010/main" val="3238785612"/>
       </p:ext>
     </p:extLst>
   </p:cSld>

</xml_diff>